<commit_message>
totales en reportes predefinidos
</commit_message>
<xml_diff>
--- a/visitas_stg/static/ppt/Reporte_Dependencia_sisef.pptx
+++ b/visitas_stg/static/ppt/Reporte_Dependencia_sisef.pptx
@@ -225,7 +225,7 @@
           <a:p>
             <a:fld id="{A12F159B-2BA9-4A4C-8F37-6A12CA4521B5}" type="datetimeFigureOut">
               <a:rPr lang="es-MX" smtClean="0"/>
-              <a:t>27/10/2015</a:t>
+              <a:t>08/11/2015</a:t>
             </a:fld>
             <a:endParaRPr lang="es-MX"/>
           </a:p>
@@ -390,7 +390,7 @@
           <a:p>
             <a:fld id="{E725DF0C-0434-4166-AFB2-E9FB5C8C5747}" type="datetimeFigureOut">
               <a:rPr lang="es-MX" smtClean="0"/>
-              <a:t>27/10/2015</a:t>
+              <a:t>08/11/2015</a:t>
             </a:fld>
             <a:endParaRPr lang="es-MX"/>
           </a:p>
@@ -853,7 +853,7 @@
           <a:p>
             <a:fld id="{F4C741E7-0659-46B3-91BB-B8C3B98C4B5D}" type="datetimeFigureOut">
               <a:rPr lang="es-MX" smtClean="0"/>
-              <a:t>27/10/2015</a:t>
+              <a:t>08/11/2015</a:t>
             </a:fld>
             <a:endParaRPr lang="es-MX"/>
           </a:p>
@@ -1070,7 +1070,7 @@
           <a:p>
             <a:fld id="{F4C741E7-0659-46B3-91BB-B8C3B98C4B5D}" type="datetimeFigureOut">
               <a:rPr lang="es-MX" smtClean="0"/>
-              <a:t>27/10/2015</a:t>
+              <a:t>08/11/2015</a:t>
             </a:fld>
             <a:endParaRPr lang="es-MX"/>
           </a:p>
@@ -1280,7 +1280,7 @@
           <a:p>
             <a:fld id="{F4C741E7-0659-46B3-91BB-B8C3B98C4B5D}" type="datetimeFigureOut">
               <a:rPr lang="es-MX" smtClean="0"/>
-              <a:t>27/10/2015</a:t>
+              <a:t>08/11/2015</a:t>
             </a:fld>
             <a:endParaRPr lang="es-MX"/>
           </a:p>
@@ -1490,7 +1490,7 @@
           <a:p>
             <a:fld id="{F4C741E7-0659-46B3-91BB-B8C3B98C4B5D}" type="datetimeFigureOut">
               <a:rPr lang="es-MX" smtClean="0"/>
-              <a:t>27/10/2015</a:t>
+              <a:t>08/11/2015</a:t>
             </a:fld>
             <a:endParaRPr lang="es-MX"/>
           </a:p>
@@ -1766,7 +1766,7 @@
           <a:p>
             <a:fld id="{F4C741E7-0659-46B3-91BB-B8C3B98C4B5D}" type="datetimeFigureOut">
               <a:rPr lang="es-MX" smtClean="0"/>
-              <a:t>27/10/2015</a:t>
+              <a:t>08/11/2015</a:t>
             </a:fld>
             <a:endParaRPr lang="es-MX"/>
           </a:p>
@@ -2092,7 +2092,7 @@
           <a:p>
             <a:fld id="{F4C741E7-0659-46B3-91BB-B8C3B98C4B5D}" type="datetimeFigureOut">
               <a:rPr lang="es-MX" smtClean="0"/>
-              <a:t>27/10/2015</a:t>
+              <a:t>08/11/2015</a:t>
             </a:fld>
             <a:endParaRPr lang="es-MX"/>
           </a:p>
@@ -2558,7 +2558,7 @@
           <a:p>
             <a:fld id="{F4C741E7-0659-46B3-91BB-B8C3B98C4B5D}" type="datetimeFigureOut">
               <a:rPr lang="es-MX" smtClean="0"/>
-              <a:t>27/10/2015</a:t>
+              <a:t>08/11/2015</a:t>
             </a:fld>
             <a:endParaRPr lang="es-MX"/>
           </a:p>
@@ -2708,7 +2708,7 @@
           <a:p>
             <a:fld id="{F4C741E7-0659-46B3-91BB-B8C3B98C4B5D}" type="datetimeFigureOut">
               <a:rPr lang="es-MX" smtClean="0"/>
-              <a:t>27/10/2015</a:t>
+              <a:t>08/11/2015</a:t>
             </a:fld>
             <a:endParaRPr lang="es-MX"/>
           </a:p>
@@ -2827,7 +2827,7 @@
           <a:p>
             <a:fld id="{F4C741E7-0659-46B3-91BB-B8C3B98C4B5D}" type="datetimeFigureOut">
               <a:rPr lang="es-MX" smtClean="0"/>
-              <a:t>27/10/2015</a:t>
+              <a:t>08/11/2015</a:t>
             </a:fld>
             <a:endParaRPr lang="es-MX"/>
           </a:p>
@@ -3137,7 +3137,7 @@
           <a:p>
             <a:fld id="{F4C741E7-0659-46B3-91BB-B8C3B98C4B5D}" type="datetimeFigureOut">
               <a:rPr lang="es-MX" smtClean="0"/>
-              <a:t>27/10/2015</a:t>
+              <a:t>08/11/2015</a:t>
             </a:fld>
             <a:endParaRPr lang="es-MX"/>
           </a:p>
@@ -3423,7 +3423,7 @@
           <a:p>
             <a:fld id="{F4C741E7-0659-46B3-91BB-B8C3B98C4B5D}" type="datetimeFigureOut">
               <a:rPr lang="es-MX" smtClean="0"/>
-              <a:t>27/10/2015</a:t>
+              <a:t>08/11/2015</a:t>
             </a:fld>
             <a:endParaRPr lang="es-MX"/>
           </a:p>
@@ -3951,14 +3951,14 @@
           <p:nvPr>
             <p:extLst>
               <p:ext uri="{D42A27DB-BD31-4B8C-83A1-F6EECF244321}">
-                <p14:modId xmlns:p14="http://schemas.microsoft.com/office/powerpoint/2010/main" val="4072944473"/>
+                <p14:modId xmlns:p14="http://schemas.microsoft.com/office/powerpoint/2010/main" val="69983054"/>
               </p:ext>
             </p:extLst>
           </p:nvPr>
         </p:nvGraphicFramePr>
         <p:xfrm>
-          <a:off x="251105" y="1995628"/>
-          <a:ext cx="1656599" cy="1711879"/>
+          <a:off x="251520" y="1981762"/>
+          <a:ext cx="1656184" cy="1827840"/>
         </p:xfrm>
         <a:graphic>
           <a:graphicData uri="http://schemas.openxmlformats.org/drawingml/2006/table">
@@ -3967,10 +3967,10 @@
                 <a:tableStyleId>{073A0DAA-6AF3-43AB-8588-CEC1D06C72B9}</a:tableStyleId>
               </a:tblPr>
               <a:tblGrid>
-                <a:gridCol w="1008527"/>
+                <a:gridCol w="1008112"/>
                 <a:gridCol w="648072"/>
               </a:tblGrid>
-              <a:tr h="288729">
+              <a:tr h="307896">
                 <a:tc>
                   <a:txBody>
                     <a:bodyPr/>
@@ -4026,7 +4026,7 @@
                   <a:tcPr marL="36000" marR="36000" marT="36000" marB="36000"/>
                 </a:tc>
               </a:tr>
-              <a:tr h="289878">
+              <a:tr h="252000">
                 <a:tc>
                   <a:txBody>
                     <a:bodyPr/>
@@ -4056,7 +4056,7 @@
                   <a:tcPr marL="36000" marR="36000" marT="36000" marB="36000"/>
                 </a:tc>
               </a:tr>
-              <a:tr h="239974">
+              <a:tr h="252000">
                 <a:tc>
                   <a:txBody>
                     <a:bodyPr/>
@@ -4086,7 +4086,7 @@
                   <a:tcPr marL="36000" marR="36000" marT="36000" marB="36000"/>
                 </a:tc>
               </a:tr>
-              <a:tr h="288729">
+              <a:tr h="252000">
                 <a:tc>
                   <a:txBody>
                     <a:bodyPr/>
@@ -4116,7 +4116,7 @@
                   <a:tcPr marL="36000" marR="36000" marT="36000" marB="36000"/>
                 </a:tc>
               </a:tr>
-              <a:tr h="288729">
+              <a:tr h="252000">
                 <a:tc>
                   <a:txBody>
                     <a:bodyPr/>
@@ -4146,7 +4146,37 @@
                   <a:tcPr marL="36000" marR="36000" marT="36000" marB="36000"/>
                 </a:tc>
               </a:tr>
-              <a:tr h="288729">
+              <a:tr h="252000">
+                <a:tc>
+                  <a:txBody>
+                    <a:bodyPr/>
+                    <a:lstStyle/>
+                    <a:p>
+                      <a:endParaRPr lang="es-MX" sz="800" dirty="0">
+                        <a:latin typeface="Arial Narrow" panose="020B0606020202030204" pitchFamily="34" charset="0"/>
+                        <a:ea typeface="Verdana" panose="020B0604030504040204" pitchFamily="34" charset="0"/>
+                        <a:cs typeface="Verdana" panose="020B0604030504040204" pitchFamily="34" charset="0"/>
+                      </a:endParaRPr>
+                    </a:p>
+                  </a:txBody>
+                  <a:tcPr marL="36000" marR="36000" marT="36000" marB="36000"/>
+                </a:tc>
+                <a:tc>
+                  <a:txBody>
+                    <a:bodyPr/>
+                    <a:lstStyle/>
+                    <a:p>
+                      <a:endParaRPr lang="es-MX" sz="800" dirty="0">
+                        <a:latin typeface="Arial Narrow" panose="020B0606020202030204" pitchFamily="34" charset="0"/>
+                        <a:ea typeface="Verdana" panose="020B0604030504040204" pitchFamily="34" charset="0"/>
+                        <a:cs typeface="Verdana" panose="020B0604030504040204" pitchFamily="34" charset="0"/>
+                      </a:endParaRPr>
+                    </a:p>
+                  </a:txBody>
+                  <a:tcPr marL="36000" marR="36000" marT="36000" marB="36000"/>
+                </a:tc>
+              </a:tr>
+              <a:tr h="252000">
                 <a:tc>
                   <a:txBody>
                     <a:bodyPr/>
@@ -4189,14 +4219,14 @@
           <p:nvPr>
             <p:extLst>
               <p:ext uri="{D42A27DB-BD31-4B8C-83A1-F6EECF244321}">
-                <p14:modId xmlns:p14="http://schemas.microsoft.com/office/powerpoint/2010/main" val="3932024780"/>
+                <p14:modId xmlns:p14="http://schemas.microsoft.com/office/powerpoint/2010/main" val="4050288608"/>
               </p:ext>
             </p:extLst>
           </p:nvPr>
         </p:nvGraphicFramePr>
         <p:xfrm>
           <a:off x="1995217" y="2003014"/>
-          <a:ext cx="1635478" cy="1698323"/>
+          <a:ext cx="1635478" cy="1803052"/>
         </p:xfrm>
         <a:graphic>
           <a:graphicData uri="http://schemas.openxmlformats.org/drawingml/2006/table">
@@ -4264,7 +4294,7 @@
                   <a:tcPr marL="36000" marR="36000" marT="36000" marB="36000"/>
                 </a:tc>
               </a:tr>
-              <a:tr h="292210">
+              <a:tr h="252000">
                 <a:tc>
                   <a:txBody>
                     <a:bodyPr/>
@@ -4294,7 +4324,7 @@
                   <a:tcPr marL="36000" marR="36000" marT="36000" marB="36000"/>
                 </a:tc>
               </a:tr>
-              <a:tr h="241905">
+              <a:tr h="252000">
                 <a:tc>
                   <a:txBody>
                     <a:bodyPr/>
@@ -4324,7 +4354,7 @@
                   <a:tcPr marL="36000" marR="36000" marT="36000" marB="36000"/>
                 </a:tc>
               </a:tr>
-              <a:tr h="291052">
+              <a:tr h="252000">
                 <a:tc>
                   <a:txBody>
                     <a:bodyPr/>
@@ -4354,7 +4384,7 @@
                   <a:tcPr marL="36000" marR="36000" marT="36000" marB="36000"/>
                 </a:tc>
               </a:tr>
-              <a:tr h="291052">
+              <a:tr h="252000">
                 <a:tc>
                   <a:txBody>
                     <a:bodyPr/>
@@ -4384,7 +4414,37 @@
                   <a:tcPr marL="36000" marR="36000" marT="36000" marB="36000"/>
                 </a:tc>
               </a:tr>
-              <a:tr h="291052">
+              <a:tr h="252000">
+                <a:tc>
+                  <a:txBody>
+                    <a:bodyPr/>
+                    <a:lstStyle/>
+                    <a:p>
+                      <a:endParaRPr lang="es-MX" sz="800" dirty="0">
+                        <a:latin typeface="Arial Narrow" panose="020B0606020202030204" pitchFamily="34" charset="0"/>
+                        <a:ea typeface="Verdana" panose="020B0604030504040204" pitchFamily="34" charset="0"/>
+                        <a:cs typeface="Verdana" panose="020B0604030504040204" pitchFamily="34" charset="0"/>
+                      </a:endParaRPr>
+                    </a:p>
+                  </a:txBody>
+                  <a:tcPr marL="36000" marR="36000" marT="36000" marB="36000"/>
+                </a:tc>
+                <a:tc>
+                  <a:txBody>
+                    <a:bodyPr/>
+                    <a:lstStyle/>
+                    <a:p>
+                      <a:endParaRPr lang="es-MX" sz="800" dirty="0">
+                        <a:latin typeface="Arial Narrow" panose="020B0606020202030204" pitchFamily="34" charset="0"/>
+                        <a:ea typeface="Verdana" panose="020B0604030504040204" pitchFamily="34" charset="0"/>
+                        <a:cs typeface="Verdana" panose="020B0604030504040204" pitchFamily="34" charset="0"/>
+                      </a:endParaRPr>
+                    </a:p>
+                  </a:txBody>
+                  <a:tcPr marL="36000" marR="36000" marT="36000" marB="36000"/>
+                </a:tc>
+              </a:tr>
+              <a:tr h="252000">
                 <a:tc>
                   <a:txBody>
                     <a:bodyPr/>
@@ -4427,14 +4487,14 @@
           <p:nvPr>
             <p:extLst>
               <p:ext uri="{D42A27DB-BD31-4B8C-83A1-F6EECF244321}">
-                <p14:modId xmlns:p14="http://schemas.microsoft.com/office/powerpoint/2010/main" val="3512489612"/>
+                <p14:modId xmlns:p14="http://schemas.microsoft.com/office/powerpoint/2010/main" val="2020030504"/>
               </p:ext>
             </p:extLst>
           </p:nvPr>
         </p:nvGraphicFramePr>
         <p:xfrm>
           <a:off x="3746049" y="1988840"/>
-          <a:ext cx="1636054" cy="1711879"/>
+          <a:ext cx="1636054" cy="1827840"/>
         </p:xfrm>
         <a:graphic>
           <a:graphicData uri="http://schemas.openxmlformats.org/drawingml/2006/table">
@@ -4494,7 +4554,7 @@
                   <a:tcPr marL="36000" marR="36000" marT="36000" marB="36000"/>
                 </a:tc>
               </a:tr>
-              <a:tr h="289878">
+              <a:tr h="252000">
                 <a:tc>
                   <a:txBody>
                     <a:bodyPr/>
@@ -4524,7 +4584,7 @@
                   <a:tcPr marL="36000" marR="36000" marT="36000" marB="36000"/>
                 </a:tc>
               </a:tr>
-              <a:tr h="239974">
+              <a:tr h="252000">
                 <a:tc>
                   <a:txBody>
                     <a:bodyPr/>
@@ -4554,7 +4614,7 @@
                   <a:tcPr marL="36000" marR="36000" marT="36000" marB="36000"/>
                 </a:tc>
               </a:tr>
-              <a:tr h="288729">
+              <a:tr h="252000">
                 <a:tc>
                   <a:txBody>
                     <a:bodyPr/>
@@ -4584,7 +4644,7 @@
                   <a:tcPr marL="36000" marR="36000" marT="36000" marB="36000"/>
                 </a:tc>
               </a:tr>
-              <a:tr h="288729">
+              <a:tr h="252000">
                 <a:tc>
                   <a:txBody>
                     <a:bodyPr/>
@@ -4614,7 +4674,37 @@
                   <a:tcPr marL="36000" marR="36000" marT="36000" marB="36000"/>
                 </a:tc>
               </a:tr>
-              <a:tr h="288729">
+              <a:tr h="252000">
+                <a:tc>
+                  <a:txBody>
+                    <a:bodyPr/>
+                    <a:lstStyle/>
+                    <a:p>
+                      <a:endParaRPr lang="es-MX" sz="800" dirty="0">
+                        <a:latin typeface="Arial Narrow" panose="020B0606020202030204" pitchFamily="34" charset="0"/>
+                        <a:ea typeface="Verdana" panose="020B0604030504040204" pitchFamily="34" charset="0"/>
+                        <a:cs typeface="Verdana" panose="020B0604030504040204" pitchFamily="34" charset="0"/>
+                      </a:endParaRPr>
+                    </a:p>
+                  </a:txBody>
+                  <a:tcPr marL="36000" marR="36000" marT="36000" marB="36000"/>
+                </a:tc>
+                <a:tc>
+                  <a:txBody>
+                    <a:bodyPr/>
+                    <a:lstStyle/>
+                    <a:p>
+                      <a:endParaRPr lang="es-MX" sz="800" dirty="0">
+                        <a:latin typeface="Arial Narrow" panose="020B0606020202030204" pitchFamily="34" charset="0"/>
+                        <a:ea typeface="Verdana" panose="020B0604030504040204" pitchFamily="34" charset="0"/>
+                        <a:cs typeface="Verdana" panose="020B0604030504040204" pitchFamily="34" charset="0"/>
+                      </a:endParaRPr>
+                    </a:p>
+                  </a:txBody>
+                  <a:tcPr marL="36000" marR="36000" marT="36000" marB="36000"/>
+                </a:tc>
+              </a:tr>
+              <a:tr h="252000">
                 <a:tc>
                   <a:txBody>
                     <a:bodyPr/>
@@ -4657,14 +4747,14 @@
           <p:nvPr>
             <p:extLst>
               <p:ext uri="{D42A27DB-BD31-4B8C-83A1-F6EECF244321}">
-                <p14:modId xmlns:p14="http://schemas.microsoft.com/office/powerpoint/2010/main" val="856052714"/>
+                <p14:modId xmlns:p14="http://schemas.microsoft.com/office/powerpoint/2010/main" val="2979693120"/>
               </p:ext>
             </p:extLst>
           </p:nvPr>
         </p:nvGraphicFramePr>
         <p:xfrm>
           <a:off x="5490159" y="1988840"/>
-          <a:ext cx="1636054" cy="1711879"/>
+          <a:ext cx="1636054" cy="1827840"/>
         </p:xfrm>
         <a:graphic>
           <a:graphicData uri="http://schemas.openxmlformats.org/drawingml/2006/table">
@@ -4724,7 +4814,7 @@
                   <a:tcPr marL="36000" marR="36000" marT="36000" marB="36000"/>
                 </a:tc>
               </a:tr>
-              <a:tr h="289878">
+              <a:tr h="252000">
                 <a:tc>
                   <a:txBody>
                     <a:bodyPr/>
@@ -4754,7 +4844,7 @@
                   <a:tcPr marL="36000" marR="36000" marT="36000" marB="36000"/>
                 </a:tc>
               </a:tr>
-              <a:tr h="239974">
+              <a:tr h="252000">
                 <a:tc>
                   <a:txBody>
                     <a:bodyPr/>
@@ -4784,7 +4874,7 @@
                   <a:tcPr marL="36000" marR="36000" marT="36000" marB="36000"/>
                 </a:tc>
               </a:tr>
-              <a:tr h="288729">
+              <a:tr h="252000">
                 <a:tc>
                   <a:txBody>
                     <a:bodyPr/>
@@ -4814,7 +4904,7 @@
                   <a:tcPr marL="36000" marR="36000" marT="36000" marB="36000"/>
                 </a:tc>
               </a:tr>
-              <a:tr h="288729">
+              <a:tr h="252000">
                 <a:tc>
                   <a:txBody>
                     <a:bodyPr/>
@@ -4844,7 +4934,37 @@
                   <a:tcPr marL="36000" marR="36000" marT="36000" marB="36000"/>
                 </a:tc>
               </a:tr>
-              <a:tr h="288729">
+              <a:tr h="252000">
+                <a:tc>
+                  <a:txBody>
+                    <a:bodyPr/>
+                    <a:lstStyle/>
+                    <a:p>
+                      <a:endParaRPr lang="es-MX" sz="800" dirty="0">
+                        <a:latin typeface="Arial Narrow" panose="020B0606020202030204" pitchFamily="34" charset="0"/>
+                        <a:ea typeface="Verdana" panose="020B0604030504040204" pitchFamily="34" charset="0"/>
+                        <a:cs typeface="Verdana" panose="020B0604030504040204" pitchFamily="34" charset="0"/>
+                      </a:endParaRPr>
+                    </a:p>
+                  </a:txBody>
+                  <a:tcPr marL="36000" marR="36000" marT="36000" marB="36000"/>
+                </a:tc>
+                <a:tc>
+                  <a:txBody>
+                    <a:bodyPr/>
+                    <a:lstStyle/>
+                    <a:p>
+                      <a:endParaRPr lang="es-MX" sz="800" dirty="0">
+                        <a:latin typeface="Arial Narrow" panose="020B0606020202030204" pitchFamily="34" charset="0"/>
+                        <a:ea typeface="Verdana" panose="020B0604030504040204" pitchFamily="34" charset="0"/>
+                        <a:cs typeface="Verdana" panose="020B0604030504040204" pitchFamily="34" charset="0"/>
+                      </a:endParaRPr>
+                    </a:p>
+                  </a:txBody>
+                  <a:tcPr marL="36000" marR="36000" marT="36000" marB="36000"/>
+                </a:tc>
+              </a:tr>
+              <a:tr h="252000">
                 <a:tc>
                   <a:txBody>
                     <a:bodyPr/>
@@ -4887,14 +5007,14 @@
           <p:nvPr>
             <p:extLst>
               <p:ext uri="{D42A27DB-BD31-4B8C-83A1-F6EECF244321}">
-                <p14:modId xmlns:p14="http://schemas.microsoft.com/office/powerpoint/2010/main" val="2030120508"/>
+                <p14:modId xmlns:p14="http://schemas.microsoft.com/office/powerpoint/2010/main" val="3647217333"/>
               </p:ext>
             </p:extLst>
           </p:nvPr>
         </p:nvGraphicFramePr>
         <p:xfrm>
           <a:off x="7229845" y="1995627"/>
-          <a:ext cx="1636054" cy="1711879"/>
+          <a:ext cx="1636054" cy="1827840"/>
         </p:xfrm>
         <a:graphic>
           <a:graphicData uri="http://schemas.openxmlformats.org/drawingml/2006/table">
@@ -4954,7 +5074,7 @@
                   <a:tcPr marL="36000" marR="36000" marT="36000" marB="36000"/>
                 </a:tc>
               </a:tr>
-              <a:tr h="289878">
+              <a:tr h="252000">
                 <a:tc>
                   <a:txBody>
                     <a:bodyPr/>
@@ -4984,7 +5104,7 @@
                   <a:tcPr marL="36000" marR="36000" marT="36000" marB="36000"/>
                 </a:tc>
               </a:tr>
-              <a:tr h="239974">
+              <a:tr h="252000">
                 <a:tc>
                   <a:txBody>
                     <a:bodyPr/>
@@ -5014,7 +5134,7 @@
                   <a:tcPr marL="36000" marR="36000" marT="36000" marB="36000"/>
                 </a:tc>
               </a:tr>
-              <a:tr h="288729">
+              <a:tr h="252000">
                 <a:tc>
                   <a:txBody>
                     <a:bodyPr/>
@@ -5044,7 +5164,7 @@
                   <a:tcPr marL="36000" marR="36000" marT="36000" marB="36000"/>
                 </a:tc>
               </a:tr>
-              <a:tr h="288729">
+              <a:tr h="252000">
                 <a:tc>
                   <a:txBody>
                     <a:bodyPr/>
@@ -5074,7 +5194,37 @@
                   <a:tcPr marL="36000" marR="36000" marT="36000" marB="36000"/>
                 </a:tc>
               </a:tr>
-              <a:tr h="288729">
+              <a:tr h="252000">
+                <a:tc>
+                  <a:txBody>
+                    <a:bodyPr/>
+                    <a:lstStyle/>
+                    <a:p>
+                      <a:endParaRPr lang="es-MX" sz="800" dirty="0">
+                        <a:latin typeface="Arial Narrow" panose="020B0606020202030204" pitchFamily="34" charset="0"/>
+                        <a:ea typeface="Verdana" panose="020B0604030504040204" pitchFamily="34" charset="0"/>
+                        <a:cs typeface="Verdana" panose="020B0604030504040204" pitchFamily="34" charset="0"/>
+                      </a:endParaRPr>
+                    </a:p>
+                  </a:txBody>
+                  <a:tcPr marL="36000" marR="36000" marT="36000" marB="36000"/>
+                </a:tc>
+                <a:tc>
+                  <a:txBody>
+                    <a:bodyPr/>
+                    <a:lstStyle/>
+                    <a:p>
+                      <a:endParaRPr lang="es-MX" sz="800" dirty="0">
+                        <a:latin typeface="Arial Narrow" panose="020B0606020202030204" pitchFamily="34" charset="0"/>
+                        <a:ea typeface="Verdana" panose="020B0604030504040204" pitchFamily="34" charset="0"/>
+                        <a:cs typeface="Verdana" panose="020B0604030504040204" pitchFamily="34" charset="0"/>
+                      </a:endParaRPr>
+                    </a:p>
+                  </a:txBody>
+                  <a:tcPr marL="36000" marR="36000" marT="36000" marB="36000"/>
+                </a:tc>
+              </a:tr>
+              <a:tr h="252000">
                 <a:tc>
                   <a:txBody>
                     <a:bodyPr/>
@@ -5117,13 +5267,13 @@
           <p:nvPr>
             <p:extLst>
               <p:ext uri="{D42A27DB-BD31-4B8C-83A1-F6EECF244321}">
-                <p14:modId xmlns:p14="http://schemas.microsoft.com/office/powerpoint/2010/main" val="2739785473"/>
+                <p14:modId xmlns:p14="http://schemas.microsoft.com/office/powerpoint/2010/main" val="2966534184"/>
               </p:ext>
             </p:extLst>
           </p:nvPr>
         </p:nvGraphicFramePr>
         <p:xfrm>
-          <a:off x="294705" y="3952186"/>
+          <a:off x="294705" y="4028386"/>
           <a:ext cx="3868889" cy="1614933"/>
         </p:xfrm>
         <a:graphic>
@@ -5956,14 +6106,14 @@
           <p:nvPr>
             <p:extLst>
               <p:ext uri="{D42A27DB-BD31-4B8C-83A1-F6EECF244321}">
-                <p14:modId xmlns:p14="http://schemas.microsoft.com/office/powerpoint/2010/main" val="2711191331"/>
+                <p14:modId xmlns:p14="http://schemas.microsoft.com/office/powerpoint/2010/main" val="3661850952"/>
               </p:ext>
             </p:extLst>
           </p:nvPr>
         </p:nvGraphicFramePr>
         <p:xfrm>
-          <a:off x="4399987" y="4114269"/>
-          <a:ext cx="1363549" cy="1107310"/>
+          <a:off x="4399987" y="4219044"/>
+          <a:ext cx="1363549" cy="1008000"/>
         </p:xfrm>
         <a:graphic>
           <a:graphicData uri="http://schemas.openxmlformats.org/drawingml/2006/table">
@@ -5975,7 +6125,7 @@
                 <a:gridCol w="878646"/>
                 <a:gridCol w="484903"/>
               </a:tblGrid>
-              <a:tr h="288729">
+              <a:tr h="252000">
                 <a:tc>
                   <a:txBody>
                     <a:bodyPr/>
@@ -6023,7 +6173,7 @@
                   <a:tcPr marL="36000" marR="36000" marT="36000" marB="36000"/>
                 </a:tc>
               </a:tr>
-              <a:tr h="289878">
+              <a:tr h="252000">
                 <a:tc>
                   <a:txBody>
                     <a:bodyPr/>
@@ -6053,7 +6203,7 @@
                   <a:tcPr marL="36000" marR="36000" marT="36000" marB="36000"/>
                 </a:tc>
               </a:tr>
-              <a:tr h="239974">
+              <a:tr h="252000">
                 <a:tc>
                   <a:txBody>
                     <a:bodyPr/>
@@ -6083,7 +6233,7 @@
                   <a:tcPr marL="36000" marR="36000" marT="36000" marB="36000"/>
                 </a:tc>
               </a:tr>
-              <a:tr h="288729">
+              <a:tr h="252000">
                 <a:tc>
                   <a:txBody>
                     <a:bodyPr/>
@@ -6126,14 +6276,14 @@
           <p:nvPr>
             <p:extLst>
               <p:ext uri="{D42A27DB-BD31-4B8C-83A1-F6EECF244321}">
-                <p14:modId xmlns:p14="http://schemas.microsoft.com/office/powerpoint/2010/main" val="3023464692"/>
+                <p14:modId xmlns:p14="http://schemas.microsoft.com/office/powerpoint/2010/main" val="459803316"/>
               </p:ext>
             </p:extLst>
           </p:nvPr>
         </p:nvGraphicFramePr>
         <p:xfrm>
           <a:off x="4395915" y="5533209"/>
-          <a:ext cx="1378311" cy="1124200"/>
+          <a:ext cx="1378311" cy="1008000"/>
         </p:xfrm>
         <a:graphic>
           <a:graphicData uri="http://schemas.openxmlformats.org/drawingml/2006/table">
@@ -6145,7 +6295,7 @@
                 <a:gridCol w="880046"/>
                 <a:gridCol w="498265"/>
               </a:tblGrid>
-              <a:tr h="260104">
+              <a:tr h="252000">
                 <a:tc>
                   <a:txBody>
                     <a:bodyPr/>
@@ -6193,7 +6343,7 @@
                   <a:tcPr marL="36000" marR="36000" marT="36000" marB="36000"/>
                 </a:tc>
               </a:tr>
-              <a:tr h="288032">
+              <a:tr h="252000">
                 <a:tc>
                   <a:txBody>
                     <a:bodyPr/>
@@ -6223,7 +6373,7 @@
                   <a:tcPr marL="36000" marR="36000" marT="36000" marB="36000"/>
                 </a:tc>
               </a:tr>
-              <a:tr h="288032">
+              <a:tr h="252000">
                 <a:tc>
                   <a:txBody>
                     <a:bodyPr/>
@@ -6253,7 +6403,7 @@
                   <a:tcPr marL="36000" marR="36000" marT="36000" marB="36000"/>
                 </a:tc>
               </a:tr>
-              <a:tr h="288032">
+              <a:tr h="252000">
                 <a:tc>
                   <a:txBody>
                     <a:bodyPr/>
@@ -6519,7 +6669,7 @@
         <p:spPr>
           <a:xfrm>
             <a:off x="203935" y="1728655"/>
-            <a:ext cx="8715123" cy="2060385"/>
+            <a:ext cx="8715123" cy="2155941"/>
           </a:xfrm>
           <a:prstGeom prst="rect">
             <a:avLst/>
@@ -6861,8 +7011,8 @@
         </p:nvSpPr>
         <p:spPr>
           <a:xfrm>
-            <a:off x="4361512" y="3874723"/>
-            <a:ext cx="1458508" cy="2866645"/>
+            <a:off x="4361512" y="3950925"/>
+            <a:ext cx="1458508" cy="2790444"/>
           </a:xfrm>
           <a:prstGeom prst="rect">
             <a:avLst/>
@@ -6909,7 +7059,7 @@
         </p:nvSpPr>
         <p:spPr>
           <a:xfrm>
-            <a:off x="4394538" y="3874723"/>
+            <a:off x="4394538" y="3979498"/>
             <a:ext cx="1395807" cy="215444"/>
           </a:xfrm>
           <a:prstGeom prst="rect">
@@ -6987,7 +7137,7 @@
         </p:nvSpPr>
         <p:spPr>
           <a:xfrm>
-            <a:off x="203936" y="3874724"/>
+            <a:off x="203936" y="3950924"/>
             <a:ext cx="4079750" cy="1764404"/>
           </a:xfrm>
           <a:prstGeom prst="rect">
@@ -7074,7 +7224,7 @@
         </p:nvSpPr>
         <p:spPr>
           <a:xfrm>
-            <a:off x="152225" y="5700149"/>
+            <a:off x="152225" y="5709674"/>
             <a:ext cx="4054222" cy="215444"/>
           </a:xfrm>
           <a:prstGeom prst="rect">

</xml_diff>

<commit_message>
reporte de trece entidades
</commit_message>
<xml_diff>
--- a/visitas_stg/static/ppt/Reporte_Dependencia_sisef.pptx
+++ b/visitas_stg/static/ppt/Reporte_Dependencia_sisef.pptx
@@ -12,8 +12,8 @@
   </p:handoutMasterIdLst>
   <p:sldIdLst>
     <p:sldId id="256" r:id="rId2"/>
-    <p:sldId id="258" r:id="rId3"/>
-    <p:sldId id="257" r:id="rId4"/>
+    <p:sldId id="257" r:id="rId3"/>
+    <p:sldId id="258" r:id="rId4"/>
   </p:sldIdLst>
   <p:sldSz cx="9144000" cy="6858000" type="screen4x3"/>
   <p:notesSz cx="6858000" cy="9144000"/>
@@ -227,7 +227,7 @@
           <a:p>
             <a:fld id="{A12F159B-2BA9-4A4C-8F37-6A12CA4521B5}" type="datetimeFigureOut">
               <a:rPr lang="es-MX" smtClean="0"/>
-              <a:t>12/11/2015</a:t>
+              <a:t>13/11/2015</a:t>
             </a:fld>
             <a:endParaRPr lang="es-MX"/>
           </a:p>
@@ -392,7 +392,7 @@
           <a:p>
             <a:fld id="{E725DF0C-0434-4166-AFB2-E9FB5C8C5747}" type="datetimeFigureOut">
               <a:rPr lang="es-MX" smtClean="0"/>
-              <a:t>12/11/2015</a:t>
+              <a:t>13/11/2015</a:t>
             </a:fld>
             <a:endParaRPr lang="es-MX"/>
           </a:p>
@@ -855,7 +855,7 @@
           <a:p>
             <a:fld id="{F4C741E7-0659-46B3-91BB-B8C3B98C4B5D}" type="datetimeFigureOut">
               <a:rPr lang="es-MX" smtClean="0"/>
-              <a:t>12/11/2015</a:t>
+              <a:t>13/11/2015</a:t>
             </a:fld>
             <a:endParaRPr lang="es-MX"/>
           </a:p>
@@ -1072,7 +1072,7 @@
           <a:p>
             <a:fld id="{F4C741E7-0659-46B3-91BB-B8C3B98C4B5D}" type="datetimeFigureOut">
               <a:rPr lang="es-MX" smtClean="0"/>
-              <a:t>12/11/2015</a:t>
+              <a:t>13/11/2015</a:t>
             </a:fld>
             <a:endParaRPr lang="es-MX"/>
           </a:p>
@@ -1282,7 +1282,7 @@
           <a:p>
             <a:fld id="{F4C741E7-0659-46B3-91BB-B8C3B98C4B5D}" type="datetimeFigureOut">
               <a:rPr lang="es-MX" smtClean="0"/>
-              <a:t>12/11/2015</a:t>
+              <a:t>13/11/2015</a:t>
             </a:fld>
             <a:endParaRPr lang="es-MX"/>
           </a:p>
@@ -1492,7 +1492,7 @@
           <a:p>
             <a:fld id="{F4C741E7-0659-46B3-91BB-B8C3B98C4B5D}" type="datetimeFigureOut">
               <a:rPr lang="es-MX" smtClean="0"/>
-              <a:t>12/11/2015</a:t>
+              <a:t>13/11/2015</a:t>
             </a:fld>
             <a:endParaRPr lang="es-MX"/>
           </a:p>
@@ -1768,7 +1768,7 @@
           <a:p>
             <a:fld id="{F4C741E7-0659-46B3-91BB-B8C3B98C4B5D}" type="datetimeFigureOut">
               <a:rPr lang="es-MX" smtClean="0"/>
-              <a:t>12/11/2015</a:t>
+              <a:t>13/11/2015</a:t>
             </a:fld>
             <a:endParaRPr lang="es-MX"/>
           </a:p>
@@ -2094,7 +2094,7 @@
           <a:p>
             <a:fld id="{F4C741E7-0659-46B3-91BB-B8C3B98C4B5D}" type="datetimeFigureOut">
               <a:rPr lang="es-MX" smtClean="0"/>
-              <a:t>12/11/2015</a:t>
+              <a:t>13/11/2015</a:t>
             </a:fld>
             <a:endParaRPr lang="es-MX"/>
           </a:p>
@@ -2560,7 +2560,7 @@
           <a:p>
             <a:fld id="{F4C741E7-0659-46B3-91BB-B8C3B98C4B5D}" type="datetimeFigureOut">
               <a:rPr lang="es-MX" smtClean="0"/>
-              <a:t>12/11/2015</a:t>
+              <a:t>13/11/2015</a:t>
             </a:fld>
             <a:endParaRPr lang="es-MX"/>
           </a:p>
@@ -2710,7 +2710,7 @@
           <a:p>
             <a:fld id="{F4C741E7-0659-46B3-91BB-B8C3B98C4B5D}" type="datetimeFigureOut">
               <a:rPr lang="es-MX" smtClean="0"/>
-              <a:t>12/11/2015</a:t>
+              <a:t>13/11/2015</a:t>
             </a:fld>
             <a:endParaRPr lang="es-MX"/>
           </a:p>
@@ -2829,7 +2829,7 @@
           <a:p>
             <a:fld id="{F4C741E7-0659-46B3-91BB-B8C3B98C4B5D}" type="datetimeFigureOut">
               <a:rPr lang="es-MX" smtClean="0"/>
-              <a:t>12/11/2015</a:t>
+              <a:t>13/11/2015</a:t>
             </a:fld>
             <a:endParaRPr lang="es-MX"/>
           </a:p>
@@ -3139,7 +3139,7 @@
           <a:p>
             <a:fld id="{F4C741E7-0659-46B3-91BB-B8C3B98C4B5D}" type="datetimeFigureOut">
               <a:rPr lang="es-MX" smtClean="0"/>
-              <a:t>12/11/2015</a:t>
+              <a:t>13/11/2015</a:t>
             </a:fld>
             <a:endParaRPr lang="es-MX"/>
           </a:p>
@@ -3425,7 +3425,7 @@
           <a:p>
             <a:fld id="{F4C741E7-0659-46B3-91BB-B8C3B98C4B5D}" type="datetimeFigureOut">
               <a:rPr lang="es-MX" smtClean="0"/>
-              <a:t>12/11/2015</a:t>
+              <a:t>13/11/2015</a:t>
             </a:fld>
             <a:endParaRPr lang="es-MX"/>
           </a:p>
@@ -3559,15 +3559,15 @@
           </a:ln>
           <a:effectLst/>
           <a:extLst>
-            <a:ext uri="{909E8E84-426E-40DD-AFC4-6F175D3DCCD1}">
-              <a14:hiddenFill xmlns:a14="http://schemas.microsoft.com/office/drawing/2010/main">
+            <a:ext uri="{909E8E84-426E-40dd-AFC4-6F175D3DCCD1}">
+              <a14:hiddenFill xmlns:a14="http://schemas.microsoft.com/office/drawing/2010/main" xmlns="">
                 <a:solidFill>
                   <a:schemeClr val="accent1"/>
                 </a:solidFill>
               </a14:hiddenFill>
             </a:ext>
-            <a:ext uri="{91240B29-F687-4F45-9708-019B960494DF}">
-              <a14:hiddenLine xmlns:a14="http://schemas.microsoft.com/office/drawing/2010/main" w="9525">
+            <a:ext uri="{91240B29-F687-4f45-9708-019B960494DF}">
+              <a14:hiddenLine xmlns:a14="http://schemas.microsoft.com/office/drawing/2010/main" xmlns="" w="9525">
                 <a:solidFill>
                   <a:schemeClr val="tx1"/>
                 </a:solidFill>
@@ -3576,8 +3576,8 @@
                 <a:tailEnd/>
               </a14:hiddenLine>
             </a:ext>
-            <a:ext uri="{AF507438-7753-43E0-B8FC-AC1667EBCBE1}">
-              <a14:hiddenEffects xmlns:a14="http://schemas.microsoft.com/office/drawing/2010/main">
+            <a:ext uri="{AF507438-7753-43e0-B8FC-AC1667EBCBE1}">
+              <a14:hiddenEffects xmlns:a14="http://schemas.microsoft.com/office/drawing/2010/main" xmlns="">
                 <a:effectLst>
                   <a:outerShdw dist="35921" dir="2700000" algn="ctr" rotWithShape="0">
                     <a:schemeClr val="bg2"/>
@@ -3612,12 +3612,12 @@
           <a:p>
             <a:pPr algn="r"/>
             <a:r>
-              <a:rPr lang="es-MX" sz="1000" b="0" dirty="0" smtClean="0">
+              <a:rPr lang="es-MX" sz="1000" b="1" dirty="0" smtClean="0">
                 <a:latin typeface="Verdana" panose="020B0604030504040204" pitchFamily="34" charset="0"/>
                 <a:ea typeface="Verdana" panose="020B0604030504040204" pitchFamily="34" charset="0"/>
                 <a:cs typeface="Verdana" panose="020B0604030504040204" pitchFamily="34" charset="0"/>
               </a:rPr>
-              <a:t>Sistema de Seguimiento a Entidades Federativas</a:t>
+              <a:t>SISEF</a:t>
             </a:r>
           </a:p>
           <a:p>
@@ -3628,7 +3628,7 @@
                 <a:ea typeface="Verdana" panose="020B0604030504040204" pitchFamily="34" charset="0"/>
                 <a:cs typeface="Verdana" panose="020B0604030504040204" pitchFamily="34" charset="0"/>
               </a:rPr>
-              <a:t>SISEF – Reporte</a:t>
+              <a:t>Reporte</a:t>
             </a:r>
             <a:r>
               <a:rPr lang="es-MX" sz="1000" b="1" baseline="0" dirty="0" smtClean="0">
@@ -3636,7 +3636,7 @@
                 <a:ea typeface="Verdana" panose="020B0604030504040204" pitchFamily="34" charset="0"/>
                 <a:cs typeface="Verdana" panose="020B0604030504040204" pitchFamily="34" charset="0"/>
               </a:rPr>
-              <a:t> por entidad federativa</a:t>
+              <a:t> por Dependencia</a:t>
             </a:r>
             <a:endParaRPr lang="es-MX" sz="1000" b="1" dirty="0">
               <a:latin typeface="Verdana" panose="020B0604030504040204" pitchFamily="34" charset="0"/>
@@ -3946,14 +3946,14 @@
       </p:grpSpPr>
       <p:graphicFrame>
         <p:nvGraphicFramePr>
-          <p:cNvPr id="12" name="4 Tabla"/>
+          <p:cNvPr id="2" name="4 Tabla"/>
           <p:cNvGraphicFramePr>
             <a:graphicFrameLocks noGrp="1"/>
           </p:cNvGraphicFramePr>
           <p:nvPr>
             <p:extLst>
               <p:ext uri="{D42A27DB-BD31-4B8C-83A1-F6EECF244321}">
-                <p14:modId xmlns:p14="http://schemas.microsoft.com/office/powerpoint/2010/main" val="4199433779"/>
+                <p14:modId xmlns:p14="http://schemas.microsoft.com/office/powerpoint/2010/main" val="719277439"/>
               </p:ext>
             </p:extLst>
           </p:nvPr>
@@ -4043,14 +4043,14 @@
       </p:graphicFrame>
       <p:graphicFrame>
         <p:nvGraphicFramePr>
-          <p:cNvPr id="5" name="4 Tabla"/>
+          <p:cNvPr id="3" name="4 Tabla"/>
           <p:cNvGraphicFramePr>
             <a:graphicFrameLocks noGrp="1"/>
           </p:cNvGraphicFramePr>
           <p:nvPr>
             <p:extLst>
               <p:ext uri="{D42A27DB-BD31-4B8C-83A1-F6EECF244321}">
-                <p14:modId xmlns:p14="http://schemas.microsoft.com/office/powerpoint/2010/main" val="4140295888"/>
+                <p14:modId xmlns:p14="http://schemas.microsoft.com/office/powerpoint/2010/main" val="613873551"/>
               </p:ext>
             </p:extLst>
           </p:nvPr>
@@ -4205,7 +4205,7 @@
           <p:nvPr>
             <p:extLst>
               <p:ext uri="{D42A27DB-BD31-4B8C-83A1-F6EECF244321}">
-                <p14:modId xmlns:p14="http://schemas.microsoft.com/office/powerpoint/2010/main" val="572285872"/>
+                <p14:modId xmlns:p14="http://schemas.microsoft.com/office/powerpoint/2010/main" val="363980549"/>
               </p:ext>
             </p:extLst>
           </p:nvPr>
@@ -11414,7 +11414,7 @@
       </p:graphicFrame>
       <p:sp>
         <p:nvSpPr>
-          <p:cNvPr id="3" name="2 Rectángulo"/>
+          <p:cNvPr id="5" name="2 Rectángulo"/>
           <p:cNvSpPr/>
           <p:nvPr/>
         </p:nvSpPr>
@@ -11462,7 +11462,7 @@
       </p:sp>
       <p:sp>
         <p:nvSpPr>
-          <p:cNvPr id="27" name="26 CuadroTexto"/>
+          <p:cNvPr id="6" name="26 CuadroTexto"/>
           <p:cNvSpPr txBox="1"/>
           <p:nvPr/>
         </p:nvSpPr>
@@ -11501,7 +11501,7 @@
       </p:sp>
       <p:sp>
         <p:nvSpPr>
-          <p:cNvPr id="29" name="28 CuadroTexto"/>
+          <p:cNvPr id="7" name="28 CuadroTexto"/>
           <p:cNvSpPr txBox="1"/>
           <p:nvPr/>
         </p:nvSpPr>
@@ -11577,7 +11577,7 @@
       </p:grpSpPr>
       <p:graphicFrame>
         <p:nvGraphicFramePr>
-          <p:cNvPr id="12" name="4 Tabla"/>
+          <p:cNvPr id="4" name="4 Tabla"/>
           <p:cNvGraphicFramePr>
             <a:graphicFrameLocks noGrp="1"/>
           </p:cNvGraphicFramePr>
@@ -11821,14 +11821,14 @@
       </p:graphicFrame>
       <p:graphicFrame>
         <p:nvGraphicFramePr>
-          <p:cNvPr id="4" name="Tabla 3"/>
+          <p:cNvPr id="6" name="Tabla 5"/>
           <p:cNvGraphicFramePr>
             <a:graphicFrameLocks noGrp="1"/>
           </p:cNvGraphicFramePr>
           <p:nvPr>
             <p:extLst>
               <p:ext uri="{D42A27DB-BD31-4B8C-83A1-F6EECF244321}">
-                <p14:modId xmlns:p14="http://schemas.microsoft.com/office/powerpoint/2010/main" val="1360691477"/>
+                <p14:modId xmlns:p14="http://schemas.microsoft.com/office/powerpoint/2010/main" val="295884919"/>
               </p:ext>
             </p:extLst>
           </p:nvPr>
@@ -18644,7 +18644,7 @@
       </p:graphicFrame>
       <p:sp>
         <p:nvSpPr>
-          <p:cNvPr id="3" name="2 Rectángulo"/>
+          <p:cNvPr id="7" name="2 Rectángulo"/>
           <p:cNvSpPr/>
           <p:nvPr/>
         </p:nvSpPr>
@@ -18692,7 +18692,7 @@
       </p:sp>
       <p:sp>
         <p:nvSpPr>
-          <p:cNvPr id="27" name="26 CuadroTexto"/>
+          <p:cNvPr id="8" name="26 CuadroTexto"/>
           <p:cNvSpPr txBox="1"/>
           <p:nvPr/>
         </p:nvSpPr>
@@ -18731,7 +18731,7 @@
       </p:sp>
       <p:sp>
         <p:nvSpPr>
-          <p:cNvPr id="29" name="28 CuadroTexto"/>
+          <p:cNvPr id="9" name="28 CuadroTexto"/>
           <p:cNvSpPr txBox="1"/>
           <p:nvPr/>
         </p:nvSpPr>
@@ -18771,20 +18771,13 @@
     </p:spTree>
     <p:extLst>
       <p:ext uri="{BB962C8B-B14F-4D97-AF65-F5344CB8AC3E}">
-        <p14:creationId xmlns:p14="http://schemas.microsoft.com/office/powerpoint/2010/main" val="2649468436"/>
+        <p14:creationId xmlns:p14="http://schemas.microsoft.com/office/powerpoint/2010/main" val="1598871505"/>
       </p:ext>
     </p:extLst>
   </p:cSld>
   <p:clrMapOvr>
     <a:masterClrMapping/>
   </p:clrMapOvr>
-  <p:timing>
-    <p:tnLst>
-      <p:par>
-        <p:cTn id="1" dur="indefinite" restart="never" nodeType="tmRoot"/>
-      </p:par>
-    </p:tnLst>
-  </p:timing>
 </p:sld>
 </file>
 
@@ -18807,14 +18800,14 @@
       </p:grpSpPr>
       <p:graphicFrame>
         <p:nvGraphicFramePr>
-          <p:cNvPr id="28" name="4 Tabla"/>
+          <p:cNvPr id="4" name="4 Tabla"/>
           <p:cNvGraphicFramePr>
             <a:graphicFrameLocks noGrp="1"/>
           </p:cNvGraphicFramePr>
           <p:nvPr>
             <p:extLst>
               <p:ext uri="{D42A27DB-BD31-4B8C-83A1-F6EECF244321}">
-                <p14:modId xmlns:p14="http://schemas.microsoft.com/office/powerpoint/2010/main" val="2915682312"/>
+                <p14:modId xmlns:p14="http://schemas.microsoft.com/office/powerpoint/2010/main" val="170128502"/>
               </p:ext>
             </p:extLst>
           </p:nvPr>
@@ -18904,14 +18897,14 @@
       </p:graphicFrame>
       <p:graphicFrame>
         <p:nvGraphicFramePr>
-          <p:cNvPr id="20" name="4 Tabla"/>
+          <p:cNvPr id="5" name="4 Tabla"/>
           <p:cNvGraphicFramePr>
             <a:graphicFrameLocks noGrp="1"/>
           </p:cNvGraphicFramePr>
           <p:nvPr>
             <p:extLst>
               <p:ext uri="{D42A27DB-BD31-4B8C-83A1-F6EECF244321}">
-                <p14:modId xmlns:p14="http://schemas.microsoft.com/office/powerpoint/2010/main" val="1717185067"/>
+                <p14:modId xmlns:p14="http://schemas.microsoft.com/office/powerpoint/2010/main" val="1913485345"/>
               </p:ext>
             </p:extLst>
           </p:nvPr>
@@ -19066,7 +19059,7 @@
           <p:nvPr>
             <p:extLst>
               <p:ext uri="{D42A27DB-BD31-4B8C-83A1-F6EECF244321}">
-                <p14:modId xmlns:p14="http://schemas.microsoft.com/office/powerpoint/2010/main" val="2495054351"/>
+                <p14:modId xmlns:p14="http://schemas.microsoft.com/office/powerpoint/2010/main" val="1539415720"/>
               </p:ext>
             </p:extLst>
           </p:nvPr>
@@ -19898,14 +19891,14 @@
       </p:graphicFrame>
       <p:graphicFrame>
         <p:nvGraphicFramePr>
-          <p:cNvPr id="8" name="7 Tabla"/>
+          <p:cNvPr id="7" name="7 Tabla"/>
           <p:cNvGraphicFramePr>
             <a:graphicFrameLocks noGrp="1"/>
           </p:cNvGraphicFramePr>
           <p:nvPr>
             <p:extLst>
               <p:ext uri="{D42A27DB-BD31-4B8C-83A1-F6EECF244321}">
-                <p14:modId xmlns:p14="http://schemas.microsoft.com/office/powerpoint/2010/main" val="3083137480"/>
+                <p14:modId xmlns:p14="http://schemas.microsoft.com/office/powerpoint/2010/main" val="2967389084"/>
               </p:ext>
             </p:extLst>
           </p:nvPr>
@@ -20068,14 +20061,14 @@
       </p:graphicFrame>
       <p:graphicFrame>
         <p:nvGraphicFramePr>
-          <p:cNvPr id="102" name="101 Tabla"/>
+          <p:cNvPr id="8" name="101 Tabla"/>
           <p:cNvGraphicFramePr>
             <a:graphicFrameLocks noGrp="1"/>
           </p:cNvGraphicFramePr>
           <p:nvPr>
             <p:extLst>
               <p:ext uri="{D42A27DB-BD31-4B8C-83A1-F6EECF244321}">
-                <p14:modId xmlns:p14="http://schemas.microsoft.com/office/powerpoint/2010/main" val="2544149786"/>
+                <p14:modId xmlns:p14="http://schemas.microsoft.com/office/powerpoint/2010/main" val="2399154808"/>
               </p:ext>
             </p:extLst>
           </p:nvPr>
@@ -20238,7 +20231,7 @@
       </p:graphicFrame>
       <p:sp>
         <p:nvSpPr>
-          <p:cNvPr id="27" name="26 CuadroTexto"/>
+          <p:cNvPr id="9" name="26 CuadroTexto"/>
           <p:cNvSpPr txBox="1"/>
           <p:nvPr/>
         </p:nvSpPr>
@@ -20277,7 +20270,7 @@
       </p:sp>
       <p:sp>
         <p:nvSpPr>
-          <p:cNvPr id="93" name="92 Rectángulo"/>
+          <p:cNvPr id="10" name="92 Rectángulo"/>
           <p:cNvSpPr/>
           <p:nvPr/>
         </p:nvSpPr>
@@ -20325,7 +20318,7 @@
       </p:sp>
       <p:sp>
         <p:nvSpPr>
-          <p:cNvPr id="94" name="93 CuadroTexto"/>
+          <p:cNvPr id="11" name="93 CuadroTexto"/>
           <p:cNvSpPr txBox="1"/>
           <p:nvPr/>
         </p:nvSpPr>
@@ -20368,7 +20361,7 @@
       </p:sp>
       <p:sp>
         <p:nvSpPr>
-          <p:cNvPr id="101" name="100 CuadroTexto"/>
+          <p:cNvPr id="12" name="100 CuadroTexto"/>
           <p:cNvSpPr txBox="1"/>
           <p:nvPr/>
         </p:nvSpPr>
@@ -20411,7 +20404,7 @@
       </p:sp>
       <p:sp>
         <p:nvSpPr>
-          <p:cNvPr id="189" name="92 Rectángulo"/>
+          <p:cNvPr id="13" name="92 Rectángulo"/>
           <p:cNvSpPr/>
           <p:nvPr/>
         </p:nvSpPr>
@@ -20459,7 +20452,7 @@
       </p:sp>
       <p:sp>
         <p:nvSpPr>
-          <p:cNvPr id="21" name="93 CuadroTexto"/>
+          <p:cNvPr id="14" name="93 CuadroTexto"/>
           <p:cNvSpPr txBox="1"/>
           <p:nvPr/>
         </p:nvSpPr>
@@ -20502,14 +20495,14 @@
       </p:sp>
       <p:sp>
         <p:nvSpPr>
-          <p:cNvPr id="22" name="93 CuadroTexto"/>
+          <p:cNvPr id="15" name="93 CuadroTexto"/>
           <p:cNvSpPr txBox="1"/>
           <p:nvPr/>
         </p:nvSpPr>
         <p:spPr>
           <a:xfrm>
-            <a:off x="98514" y="3851591"/>
-            <a:ext cx="4255690" cy="246221"/>
+            <a:off x="190176" y="3851592"/>
+            <a:ext cx="4164027" cy="246221"/>
           </a:xfrm>
           <a:prstGeom prst="rect">
             <a:avLst/>
@@ -20545,14 +20538,14 @@
       </p:sp>
       <p:sp>
         <p:nvSpPr>
-          <p:cNvPr id="23" name="93 CuadroTexto"/>
+          <p:cNvPr id="16" name="93 CuadroTexto"/>
           <p:cNvSpPr txBox="1"/>
           <p:nvPr/>
         </p:nvSpPr>
         <p:spPr>
           <a:xfrm>
-            <a:off x="140378" y="4155701"/>
-            <a:ext cx="4213826" cy="2708434"/>
+            <a:off x="190176" y="4155701"/>
+            <a:ext cx="4164028" cy="2708434"/>
           </a:xfrm>
           <a:prstGeom prst="rect">
             <a:avLst/>
@@ -20755,7 +20748,7 @@
       </p:sp>
       <p:sp>
         <p:nvSpPr>
-          <p:cNvPr id="37" name="28 CuadroTexto"/>
+          <p:cNvPr id="17" name="28 CuadroTexto"/>
           <p:cNvSpPr txBox="1"/>
           <p:nvPr/>
         </p:nvSpPr>
@@ -20795,20 +20788,13 @@
     </p:spTree>
     <p:extLst>
       <p:ext uri="{BB962C8B-B14F-4D97-AF65-F5344CB8AC3E}">
-        <p14:creationId xmlns:p14="http://schemas.microsoft.com/office/powerpoint/2010/main" val="448476136"/>
+        <p14:creationId xmlns:p14="http://schemas.microsoft.com/office/powerpoint/2010/main" val="758590725"/>
       </p:ext>
     </p:extLst>
   </p:cSld>
   <p:clrMapOvr>
     <a:masterClrMapping/>
   </p:clrMapOvr>
-  <p:timing>
-    <p:tnLst>
-      <p:par>
-        <p:cTn id="1" dur="indefinite" restart="never" nodeType="tmRoot"/>
-      </p:par>
-    </p:tnLst>
-  </p:timing>
 </p:sld>
 </file>
 

</xml_diff>